<commit_message>
rc scan 更新 4.0.0
</commit_message>
<xml_diff>
--- a/20170524_RCScan/2018-1207 RC SCAN 說明文件.pptx
+++ b/20170524_RCScan/2018-1207 RC SCAN 說明文件.pptx
@@ -195,9 +195,6 @@
             <p14:sldId id="315"/>
           </p14:sldIdLst>
         </p14:section>
-        <p14:section name="PURPLE THEME" id="{BAA48192-D5C0-4ACE-A8ED-1FDEAD944A1D}">
-          <p14:sldIdLst/>
-        </p14:section>
       </p14:sectionLst>
     </p:ext>
     <p:ext uri="{EFAFB233-063F-42B5-8137-9DF3F51BA10A}">
@@ -3967,7 +3964,7 @@
           <a:blip r:embed="rId2">
             <a:extLst>
               <a:ext uri="{96DAC541-7B7A-43D3-8B79-37D633B846F1}">
-                <asvg:svgBlip xmlns:asvg="http://schemas.microsoft.com/office/drawing/2016/SVG/main" r:embed="rId3"/>
+                <asvg:svgBlip xmlns:asvg="http://schemas.microsoft.com/office/drawing/2016/SVG/main" xmlns="" r:embed="rId3"/>
               </a:ext>
             </a:extLst>
           </a:blip>
@@ -4831,7 +4828,7 @@
           <a:blip r:embed="rId2">
             <a:extLst>
               <a:ext uri="{96DAC541-7B7A-43D3-8B79-37D633B846F1}">
-                <asvg:svgBlip xmlns:asvg="http://schemas.microsoft.com/office/drawing/2016/SVG/main" r:embed="rId3"/>
+                <asvg:svgBlip xmlns:asvg="http://schemas.microsoft.com/office/drawing/2016/SVG/main" xmlns="" r:embed="rId3"/>
               </a:ext>
             </a:extLst>
           </a:blip>
@@ -6385,7 +6382,7 @@
           <a:blip r:embed="rId2">
             <a:extLst>
               <a:ext uri="{96DAC541-7B7A-43D3-8B79-37D633B846F1}">
-                <asvg:svgBlip xmlns:asvg="http://schemas.microsoft.com/office/drawing/2016/SVG/main" r:embed="rId3"/>
+                <asvg:svgBlip xmlns:asvg="http://schemas.microsoft.com/office/drawing/2016/SVG/main" xmlns="" r:embed="rId3"/>
               </a:ext>
             </a:extLst>
           </a:blip>
@@ -7244,7 +7241,7 @@
           <a:blip r:embed="rId2">
             <a:extLst>
               <a:ext uri="{96DAC541-7B7A-43D3-8B79-37D633B846F1}">
-                <asvg:svgBlip xmlns:asvg="http://schemas.microsoft.com/office/drawing/2016/SVG/main" r:embed="rId3"/>
+                <asvg:svgBlip xmlns:asvg="http://schemas.microsoft.com/office/drawing/2016/SVG/main" xmlns="" r:embed="rId3"/>
               </a:ext>
             </a:extLst>
           </a:blip>
@@ -7988,7 +7985,7 @@
           <a:blip r:embed="rId2">
             <a:extLst>
               <a:ext uri="{96DAC541-7B7A-43D3-8B79-37D633B846F1}">
-                <asvg:svgBlip xmlns:asvg="http://schemas.microsoft.com/office/drawing/2016/SVG/main" r:embed="rId3"/>
+                <asvg:svgBlip xmlns:asvg="http://schemas.microsoft.com/office/drawing/2016/SVG/main" xmlns="" r:embed="rId3"/>
               </a:ext>
             </a:extLst>
           </a:blip>
@@ -8779,7 +8776,7 @@
           <a:blip r:embed="rId2">
             <a:extLst>
               <a:ext uri="{96DAC541-7B7A-43D3-8B79-37D633B846F1}">
-                <asvg:svgBlip xmlns:asvg="http://schemas.microsoft.com/office/drawing/2016/SVG/main" r:embed="rId3"/>
+                <asvg:svgBlip xmlns:asvg="http://schemas.microsoft.com/office/drawing/2016/SVG/main" xmlns="" r:embed="rId3"/>
               </a:ext>
             </a:extLst>
           </a:blip>
@@ -9180,7 +9177,7 @@
             <a:blip r:embed="rId11">
               <a:extLst>
                 <a:ext uri="{96DAC541-7B7A-43D3-8B79-37D633B846F1}">
-                  <asvg:svgBlip xmlns:asvg="http://schemas.microsoft.com/office/drawing/2016/SVG/main" r:embed="rId12"/>
+                  <asvg:svgBlip xmlns:asvg="http://schemas.microsoft.com/office/drawing/2016/SVG/main" xmlns="" r:embed="rId12"/>
                 </a:ext>
               </a:extLst>
             </a:blip>
@@ -9821,7 +9818,7 @@
           <a:blip r:embed="rId11">
             <a:extLst>
               <a:ext uri="{96DAC541-7B7A-43D3-8B79-37D633B846F1}">
-                <asvg:svgBlip xmlns:asvg="http://schemas.microsoft.com/office/drawing/2016/SVG/main" r:embed="rId12"/>
+                <asvg:svgBlip xmlns:asvg="http://schemas.microsoft.com/office/drawing/2016/SVG/main" xmlns="" r:embed="rId12"/>
               </a:ext>
             </a:extLst>
           </a:blip>
@@ -10541,7 +10538,7 @@
           <a:blip r:embed="rId11">
             <a:extLst>
               <a:ext uri="{96DAC541-7B7A-43D3-8B79-37D633B846F1}">
-                <asvg:svgBlip xmlns:asvg="http://schemas.microsoft.com/office/drawing/2016/SVG/main" r:embed="rId12"/>
+                <asvg:svgBlip xmlns:asvg="http://schemas.microsoft.com/office/drawing/2016/SVG/main" xmlns="" r:embed="rId12"/>
               </a:ext>
             </a:extLst>
           </a:blip>
@@ -12285,7 +12282,7 @@
         </p:nvSpPr>
         <p:spPr>
           <a:xfrm>
-            <a:off x="465514" y="698267"/>
+            <a:off x="922710" y="698267"/>
             <a:ext cx="2664512" cy="369332"/>
           </a:xfrm>
           <a:prstGeom prst="rect">
@@ -13114,7 +13111,7 @@
         </p:nvSpPr>
         <p:spPr>
           <a:xfrm>
-            <a:off x="465514" y="698267"/>
+            <a:off x="922712" y="698267"/>
             <a:ext cx="2672526" cy="369332"/>
           </a:xfrm>
           <a:prstGeom prst="rect">
@@ -24384,7 +24381,7 @@
         </p:nvSpPr>
         <p:spPr>
           <a:xfrm>
-            <a:off x="465514" y="698267"/>
+            <a:off x="922712" y="698267"/>
             <a:ext cx="2664512" cy="369332"/>
           </a:xfrm>
           <a:prstGeom prst="rect">
@@ -25307,7 +25304,7 @@
         </p:nvSpPr>
         <p:spPr>
           <a:xfrm>
-            <a:off x="465514" y="698267"/>
+            <a:off x="922712" y="698267"/>
             <a:ext cx="2672526" cy="369332"/>
           </a:xfrm>
           <a:prstGeom prst="rect">
@@ -26230,7 +26227,7 @@
         </p:nvSpPr>
         <p:spPr>
           <a:xfrm>
-            <a:off x="465514" y="698267"/>
+            <a:off x="922715" y="698267"/>
             <a:ext cx="4857420" cy="369332"/>
           </a:xfrm>
           <a:prstGeom prst="rect">
@@ -34541,7 +34538,7 @@
         </p:nvSpPr>
         <p:spPr>
           <a:xfrm>
-            <a:off x="465514" y="698267"/>
+            <a:off x="922712" y="698267"/>
             <a:ext cx="5972725" cy="369332"/>
           </a:xfrm>
           <a:prstGeom prst="rect">
@@ -41256,7 +41253,7 @@
         </p:nvSpPr>
         <p:spPr>
           <a:xfrm>
-            <a:off x="465514" y="698267"/>
+            <a:off x="922713" y="698267"/>
             <a:ext cx="2837636" cy="369332"/>
           </a:xfrm>
           <a:prstGeom prst="rect">
@@ -42174,7 +42171,7 @@
         </p:nvSpPr>
         <p:spPr>
           <a:xfrm>
-            <a:off x="465514" y="698267"/>
+            <a:off x="922715" y="698267"/>
             <a:ext cx="2972289" cy="369332"/>
           </a:xfrm>
           <a:prstGeom prst="rect">
@@ -43170,7 +43167,7 @@
         </p:nvSpPr>
         <p:spPr>
           <a:xfrm>
-            <a:off x="465514" y="698267"/>
+            <a:off x="922712" y="698267"/>
             <a:ext cx="2989921" cy="369332"/>
           </a:xfrm>
           <a:prstGeom prst="rect">
@@ -44009,7 +44006,7 @@
         </p:nvSpPr>
         <p:spPr>
           <a:xfrm>
-            <a:off x="465514" y="698267"/>
+            <a:off x="922716" y="698267"/>
             <a:ext cx="2654894" cy="369332"/>
           </a:xfrm>
           <a:prstGeom prst="rect">
@@ -44927,7 +44924,7 @@
         </p:nvSpPr>
         <p:spPr>
           <a:xfrm>
-            <a:off x="465514" y="698267"/>
+            <a:off x="922710" y="698267"/>
             <a:ext cx="4857420" cy="369332"/>
           </a:xfrm>
           <a:prstGeom prst="rect">
@@ -45891,7 +45888,7 @@
         </p:nvSpPr>
         <p:spPr>
           <a:xfrm>
-            <a:off x="465514" y="698267"/>
+            <a:off x="922712" y="698267"/>
             <a:ext cx="4626588" cy="369332"/>
           </a:xfrm>
           <a:prstGeom prst="rect">

</xml_diff>